<commit_message>
updated feb. monthly with allison feedback
</commit_message>
<xml_diff>
--- a/Assignments/Semester2/T12-Monthly_Report.pptx
+++ b/Assignments/Semester2/T12-Monthly_Report.pptx
@@ -238,7 +238,7 @@
           <a:p>
             <a:fld id="{EA855A4E-C10B-4301-9049-8623A4FA0189}" type="datetimeFigureOut">
               <a:rPr lang="en-US" smtClean="0"/>
-              <a:t>3/2/2020</a:t>
+              <a:t>3/6/2020</a:t>
             </a:fld>
             <a:endParaRPr lang="en-US"/>
           </a:p>
@@ -422,7 +422,7 @@
           <a:p>
             <a:fld id="{0AA11918-4594-DE4E-9D50-1A3B5A7A52B7}" type="datetimeFigureOut">
               <a:rPr lang="en-US" smtClean="0"/>
-              <a:t>3/2/2020</a:t>
+              <a:t>3/6/2020</a:t>
             </a:fld>
             <a:endParaRPr lang="en-US"/>
           </a:p>
@@ -802,14 +802,14 @@
           </a:ln>
           <a:extLst>
             <a:ext uri="{909E8E84-426E-40dd-AFC4-6F175D3DCCD1}">
-              <a14:hiddenFill xmlns:a14="http://schemas.microsoft.com/office/drawing/2010/main" xmlns="">
+              <a14:hiddenFill xmlns="" xmlns:a14="http://schemas.microsoft.com/office/drawing/2010/main">
                 <a:solidFill>
                   <a:srgbClr val="FFFFFF"/>
                 </a:solidFill>
               </a14:hiddenFill>
             </a:ext>
             <a:ext uri="{91240B29-F687-4f45-9708-019B960494DF}">
-              <a14:hiddenLine xmlns:a14="http://schemas.microsoft.com/office/drawing/2010/main" xmlns="" w="9525">
+              <a14:hiddenLine xmlns="" xmlns:a14="http://schemas.microsoft.com/office/drawing/2010/main" w="9525">
                 <a:solidFill>
                   <a:srgbClr val="000000"/>
                 </a:solidFill>
@@ -971,7 +971,7 @@
                 <a:latin typeface="Calibri"/>
               </a:rPr>
               <a:pPr/>
-              <a:t>3/2/2020</a:t>
+              <a:t>3/6/2020</a:t>
             </a:fld>
             <a:endParaRPr lang="en-US" dirty="0">
               <a:solidFill>
@@ -1205,7 +1205,7 @@
                 </a:spcAft>
                 <a:defRPr/>
               </a:pPr>
-              <a:t>3/2/2020</a:t>
+              <a:t>3/6/2020</a:t>
             </a:fld>
             <a:endParaRPr lang="en-US">
               <a:solidFill>
@@ -1402,7 +1402,7 @@
                 <a:latin typeface="Calibri"/>
               </a:rPr>
               <a:pPr/>
-              <a:t>3/2/2020</a:t>
+              <a:t>3/6/2020</a:t>
             </a:fld>
             <a:endParaRPr lang="en-US" dirty="0">
               <a:solidFill>
@@ -1558,7 +1558,7 @@
                 <a:latin typeface="Calibri"/>
               </a:rPr>
               <a:pPr/>
-              <a:t>3/2/2020</a:t>
+              <a:t>3/6/2020</a:t>
             </a:fld>
             <a:endParaRPr lang="en-US" dirty="0">
               <a:solidFill>
@@ -1762,14 +1762,14 @@
           </a:ln>
           <a:extLst>
             <a:ext uri="{909E8E84-426E-40dd-AFC4-6F175D3DCCD1}">
-              <a14:hiddenFill xmlns:a14="http://schemas.microsoft.com/office/drawing/2010/main" xmlns="">
+              <a14:hiddenFill xmlns="" xmlns:a14="http://schemas.microsoft.com/office/drawing/2010/main">
                 <a:solidFill>
                   <a:srgbClr val="FFFFFF"/>
                 </a:solidFill>
               </a14:hiddenFill>
             </a:ext>
             <a:ext uri="{91240B29-F687-4f45-9708-019B960494DF}">
-              <a14:hiddenLine xmlns:a14="http://schemas.microsoft.com/office/drawing/2010/main" xmlns="" w="9525">
+              <a14:hiddenLine xmlns="" xmlns:a14="http://schemas.microsoft.com/office/drawing/2010/main" w="9525">
                 <a:solidFill>
                   <a:srgbClr val="000000"/>
                 </a:solidFill>
@@ -1779,7 +1779,7 @@
               </a14:hiddenLine>
             </a:ext>
             <a:ext uri="{FAA26D3D-D897-4be2-8F04-BA451C77F1D7}">
-              <ma14:placeholderFlag xmlns:ma14="http://schemas.microsoft.com/office/mac/drawingml/2011/main" xmlns="" val="1"/>
+              <ma14:placeholderFlag xmlns="" xmlns:ma14="http://schemas.microsoft.com/office/mac/drawingml/2011/main" val="1"/>
             </a:ext>
           </a:extLst>
         </p:spPr>
@@ -3640,36 +3640,69 @@
           </a:p>
         </p:txBody>
       </p:sp>
-      <p:pic>
-        <p:nvPicPr>
-          <p:cNvPr id="8" name="Picture 7">
+      <p:graphicFrame>
+        <p:nvGraphicFramePr>
+          <p:cNvPr id="9" name="Object 8">
             <a:extLst>
               <a:ext uri="{FF2B5EF4-FFF2-40B4-BE49-F238E27FC236}">
-                <a16:creationId xmlns:a16="http://schemas.microsoft.com/office/drawing/2014/main" id="{15788557-FD4A-4173-BF46-887D307AFCBE}"/>
+                <a16:creationId xmlns:a16="http://schemas.microsoft.com/office/drawing/2014/main" id="{32D0B1DD-4A31-4AA6-9292-13A2D9DFF681}"/>
               </a:ext>
             </a:extLst>
           </p:cNvPr>
-          <p:cNvPicPr>
-            <a:picLocks noChangeAspect="1"/>
-          </p:cNvPicPr>
-          <p:nvPr/>
-        </p:nvPicPr>
-        <p:blipFill>
-          <a:blip r:embed="rId2"/>
-          <a:stretch>
-            <a:fillRect/>
-          </a:stretch>
-        </p:blipFill>
-        <p:spPr>
-          <a:xfrm>
-            <a:off x="840283" y="1497000"/>
-            <a:ext cx="7463434" cy="3864000"/>
-          </a:xfrm>
-          <a:prstGeom prst="rect">
-            <a:avLst/>
-          </a:prstGeom>
-        </p:spPr>
-      </p:pic>
+          <p:cNvGraphicFramePr>
+            <a:graphicFrameLocks noChangeAspect="1"/>
+          </p:cNvGraphicFramePr>
+          <p:nvPr>
+            <p:extLst>
+              <p:ext uri="{D42A27DB-BD31-4B8C-83A1-F6EECF244321}">
+                <p14:modId xmlns:p14="http://schemas.microsoft.com/office/powerpoint/2010/main" val="1689855574"/>
+              </p:ext>
+            </p:extLst>
+          </p:nvPr>
+        </p:nvGraphicFramePr>
+        <p:xfrm>
+          <a:off x="295275" y="1598613"/>
+          <a:ext cx="8431213" cy="4522787"/>
+        </p:xfrm>
+        <a:graphic>
+          <a:graphicData uri="http://schemas.openxmlformats.org/presentationml/2006/ole">
+            <mc:AlternateContent xmlns:mc="http://schemas.openxmlformats.org/markup-compatibility/2006">
+              <mc:Choice xmlns:v="urn:schemas-microsoft-com:vml" Requires="v">
+                <p:oleObj spid="_x0000_s1026" name="Worksheet" r:id="rId3" imgW="5149838" imgH="2762228" progId="Excel.Sheet.12">
+                  <p:embed/>
+                </p:oleObj>
+              </mc:Choice>
+              <mc:Fallback>
+                <p:oleObj name="Worksheet" r:id="rId3" imgW="5149838" imgH="2762228" progId="Excel.Sheet.12">
+                  <p:embed/>
+                  <p:pic>
+                    <p:nvPicPr>
+                      <p:cNvPr id="6" name="Object 5"/>
+                      <p:cNvPicPr/>
+                      <p:nvPr/>
+                    </p:nvPicPr>
+                    <p:blipFill>
+                      <a:blip r:embed="rId4"/>
+                      <a:stretch>
+                        <a:fillRect/>
+                      </a:stretch>
+                    </p:blipFill>
+                    <p:spPr>
+                      <a:xfrm>
+                        <a:off x="295275" y="1598613"/>
+                        <a:ext cx="8431213" cy="4522787"/>
+                      </a:xfrm>
+                      <a:prstGeom prst="rect">
+                        <a:avLst/>
+                      </a:prstGeom>
+                    </p:spPr>
+                  </p:pic>
+                </p:oleObj>
+              </mc:Fallback>
+            </mc:AlternateContent>
+          </a:graphicData>
+        </a:graphic>
+      </p:graphicFrame>
     </p:spTree>
     <p:extLst>
       <p:ext uri="{BB962C8B-B14F-4D97-AF65-F5344CB8AC3E}">

</xml_diff>